<commit_message>
Evolutions des programmes .ino Présentation pour la journée du 5 mai
</commit_message>
<xml_diff>
--- a/Journée du 5 mai 2023.pptx
+++ b/Journée du 5 mai 2023.pptx
@@ -6098,7 +6098,7 @@
             </a:r>
             <a:r>
               <a:rPr lang="fr-FR" dirty="0" smtClean="0"/>
-              <a:t>) et donc il n’apprendra plus rien </a:t>
+              <a:t>) et donc il n’apprendra plus rien !!</a:t>
             </a:r>
           </a:p>
           <a:p>
@@ -6127,7 +6127,7 @@
             <a:pPr lvl="2"/>
             <a:r>
               <a:rPr lang="fr-FR" dirty="0" smtClean="0"/>
-              <a:t>On lui donne des phrases (</a:t>
+              <a:t>1) On lui donne des phrases (</a:t>
             </a:r>
             <a:r>
               <a:rPr lang="fr-FR" i="1" dirty="0" smtClean="0">
@@ -6159,7 +6159,7 @@
             <a:pPr lvl="2"/>
             <a:r>
               <a:rPr lang="fr-FR" dirty="0" smtClean="0"/>
-              <a:t>Et lui complète ce contexte par des phrases qui complète de façon la plus </a:t>
+              <a:t>2) Et lui, complète ce contexte par des phrases qui complètent de façon la plus </a:t>
             </a:r>
             <a:r>
               <a:rPr lang="fr-FR" sz="2400" b="1" dirty="0" smtClean="0">
@@ -6171,7 +6171,15 @@
             </a:r>
             <a:r>
               <a:rPr lang="fr-FR" dirty="0" smtClean="0"/>
-              <a:t> (statistiquement) par rapport à ce qui a appris</a:t>
+              <a:t> (statistiquement) ce contexte par rapport à tout </a:t>
+            </a:r>
+            <a:r>
+              <a:rPr lang="fr-FR" smtClean="0"/>
+              <a:t>ce qu’il </a:t>
+            </a:r>
+            <a:r>
+              <a:rPr lang="fr-FR" dirty="0" smtClean="0"/>
+              <a:t>a appris</a:t>
             </a:r>
           </a:p>
           <a:p>

</xml_diff>